<commit_message>
Aggiunto un pivot e sistemato il template ppt
</commit_message>
<xml_diff>
--- a/Solution/Templates/Template_PowerPoint.pptx
+++ b/Solution/Templates/Template_PowerPoint.pptx
@@ -246,7 +246,7 @@
           <a:p>
             <a:fld id="{B17043DB-5DC9-4799-B208-3BF17198D022}" type="datetimeFigureOut">
               <a:rPr lang="en-GB" smtClean="0"/>
-              <a:t>17/09/2025</a:t>
+              <a:t>19/09/2025</a:t>
             </a:fld>
             <a:endParaRPr lang="en-GB"/>
           </a:p>
@@ -416,7 +416,7 @@
           <a:p>
             <a:fld id="{B17043DB-5DC9-4799-B208-3BF17198D022}" type="datetimeFigureOut">
               <a:rPr lang="en-GB" smtClean="0"/>
-              <a:t>17/09/2025</a:t>
+              <a:t>19/09/2025</a:t>
             </a:fld>
             <a:endParaRPr lang="en-GB"/>
           </a:p>
@@ -596,7 +596,7 @@
           <a:p>
             <a:fld id="{B17043DB-5DC9-4799-B208-3BF17198D022}" type="datetimeFigureOut">
               <a:rPr lang="en-GB" smtClean="0"/>
-              <a:t>17/09/2025</a:t>
+              <a:t>19/09/2025</a:t>
             </a:fld>
             <a:endParaRPr lang="en-GB"/>
           </a:p>
@@ -766,7 +766,7 @@
           <a:p>
             <a:fld id="{B17043DB-5DC9-4799-B208-3BF17198D022}" type="datetimeFigureOut">
               <a:rPr lang="en-GB" smtClean="0"/>
-              <a:t>17/09/2025</a:t>
+              <a:t>19/09/2025</a:t>
             </a:fld>
             <a:endParaRPr lang="en-GB"/>
           </a:p>
@@ -1012,7 +1012,7 @@
           <a:p>
             <a:fld id="{B17043DB-5DC9-4799-B208-3BF17198D022}" type="datetimeFigureOut">
               <a:rPr lang="en-GB" smtClean="0"/>
-              <a:t>17/09/2025</a:t>
+              <a:t>19/09/2025</a:t>
             </a:fld>
             <a:endParaRPr lang="en-GB"/>
           </a:p>
@@ -1244,7 +1244,7 @@
           <a:p>
             <a:fld id="{B17043DB-5DC9-4799-B208-3BF17198D022}" type="datetimeFigureOut">
               <a:rPr lang="en-GB" smtClean="0"/>
-              <a:t>17/09/2025</a:t>
+              <a:t>19/09/2025</a:t>
             </a:fld>
             <a:endParaRPr lang="en-GB"/>
           </a:p>
@@ -1611,7 +1611,7 @@
           <a:p>
             <a:fld id="{B17043DB-5DC9-4799-B208-3BF17198D022}" type="datetimeFigureOut">
               <a:rPr lang="en-GB" smtClean="0"/>
-              <a:t>17/09/2025</a:t>
+              <a:t>19/09/2025</a:t>
             </a:fld>
             <a:endParaRPr lang="en-GB"/>
           </a:p>
@@ -1729,7 +1729,7 @@
           <a:p>
             <a:fld id="{B17043DB-5DC9-4799-B208-3BF17198D022}" type="datetimeFigureOut">
               <a:rPr lang="en-GB" smtClean="0"/>
-              <a:t>17/09/2025</a:t>
+              <a:t>19/09/2025</a:t>
             </a:fld>
             <a:endParaRPr lang="en-GB"/>
           </a:p>
@@ -1824,7 +1824,7 @@
           <a:p>
             <a:fld id="{B17043DB-5DC9-4799-B208-3BF17198D022}" type="datetimeFigureOut">
               <a:rPr lang="en-GB" smtClean="0"/>
-              <a:t>17/09/2025</a:t>
+              <a:t>19/09/2025</a:t>
             </a:fld>
             <a:endParaRPr lang="en-GB"/>
           </a:p>
@@ -2101,7 +2101,7 @@
           <a:p>
             <a:fld id="{B17043DB-5DC9-4799-B208-3BF17198D022}" type="datetimeFigureOut">
               <a:rPr lang="en-GB" smtClean="0"/>
-              <a:t>17/09/2025</a:t>
+              <a:t>19/09/2025</a:t>
             </a:fld>
             <a:endParaRPr lang="en-GB"/>
           </a:p>
@@ -2354,7 +2354,7 @@
           <a:p>
             <a:fld id="{B17043DB-5DC9-4799-B208-3BF17198D022}" type="datetimeFigureOut">
               <a:rPr lang="en-GB" smtClean="0"/>
-              <a:t>17/09/2025</a:t>
+              <a:t>19/09/2025</a:t>
             </a:fld>
             <a:endParaRPr lang="en-GB"/>
           </a:p>
@@ -2567,7 +2567,7 @@
           <a:p>
             <a:fld id="{B17043DB-5DC9-4799-B208-3BF17198D022}" type="datetimeFigureOut">
               <a:rPr lang="en-GB" smtClean="0"/>
-              <a:t>17/09/2025</a:t>
+              <a:t>19/09/2025</a:t>
             </a:fld>
             <a:endParaRPr lang="en-GB"/>
           </a:p>
@@ -2982,9 +2982,16 @@
             <p:ph type="ctrTitle"/>
           </p:nvPr>
         </p:nvSpPr>
-        <p:spPr/>
-        <p:txBody>
-          <a:bodyPr/>
+        <p:spPr>
+          <a:xfrm flipH="1">
+            <a:off x="11493778" y="87117"/>
+            <a:ext cx="566633" cy="843396"/>
+          </a:xfrm>
+        </p:spPr>
+        <p:txBody>
+          <a:bodyPr>
+            <a:normAutofit fontScale="90000"/>
+          </a:bodyPr>
           <a:lstStyle/>
           <a:p>
             <a:r>
@@ -2992,25 +2999,6 @@
               <a:t>1</a:t>
             </a:r>
             <a:endParaRPr lang="en-GB" dirty="0"/>
-          </a:p>
-        </p:txBody>
-      </p:sp>
-      <p:sp>
-        <p:nvSpPr>
-          <p:cNvPr id="3" name="Subtitle 2"/>
-          <p:cNvSpPr>
-            <a:spLocks noGrp="1"/>
-          </p:cNvSpPr>
-          <p:nvPr>
-            <p:ph type="subTitle" idx="1"/>
-          </p:nvPr>
-        </p:nvSpPr>
-        <p:spPr/>
-        <p:txBody>
-          <a:bodyPr/>
-          <a:lstStyle/>
-          <a:p>
-            <a:endParaRPr lang="en-GB"/>
           </a:p>
         </p:txBody>
       </p:sp>
@@ -3054,9 +3042,16 @@
             <p:ph type="ctrTitle"/>
           </p:nvPr>
         </p:nvSpPr>
-        <p:spPr/>
-        <p:txBody>
-          <a:bodyPr/>
+        <p:spPr>
+          <a:xfrm flipH="1">
+            <a:off x="11493778" y="87117"/>
+            <a:ext cx="566633" cy="843396"/>
+          </a:xfrm>
+        </p:spPr>
+        <p:txBody>
+          <a:bodyPr>
+            <a:normAutofit fontScale="90000"/>
+          </a:bodyPr>
           <a:lstStyle/>
           <a:p>
             <a:r>
@@ -3064,32 +3059,13 @@
               <a:t>2</a:t>
             </a:r>
             <a:endParaRPr lang="en-GB" dirty="0"/>
-          </a:p>
-        </p:txBody>
-      </p:sp>
-      <p:sp>
-        <p:nvSpPr>
-          <p:cNvPr id="3" name="Subtitle 2"/>
-          <p:cNvSpPr>
-            <a:spLocks noGrp="1"/>
-          </p:cNvSpPr>
-          <p:nvPr>
-            <p:ph type="subTitle" idx="1"/>
-          </p:nvPr>
-        </p:nvSpPr>
-        <p:spPr/>
-        <p:txBody>
-          <a:bodyPr/>
-          <a:lstStyle/>
-          <a:p>
-            <a:endParaRPr lang="en-GB"/>
           </a:p>
         </p:txBody>
       </p:sp>
     </p:spTree>
     <p:extLst>
       <p:ext uri="{BB962C8B-B14F-4D97-AF65-F5344CB8AC3E}">
-        <p14:creationId xmlns:p14="http://schemas.microsoft.com/office/powerpoint/2010/main" val="1991358441"/>
+        <p14:creationId xmlns:p14="http://schemas.microsoft.com/office/powerpoint/2010/main" val="2758831865"/>
       </p:ext>
     </p:extLst>
   </p:cSld>
@@ -3126,9 +3102,16 @@
             <p:ph type="ctrTitle"/>
           </p:nvPr>
         </p:nvSpPr>
-        <p:spPr/>
-        <p:txBody>
-          <a:bodyPr/>
+        <p:spPr>
+          <a:xfrm flipH="1">
+            <a:off x="11493778" y="87117"/>
+            <a:ext cx="566633" cy="843396"/>
+          </a:xfrm>
+        </p:spPr>
+        <p:txBody>
+          <a:bodyPr>
+            <a:normAutofit fontScale="90000"/>
+          </a:bodyPr>
           <a:lstStyle/>
           <a:p>
             <a:r>
@@ -3136,32 +3119,13 @@
               <a:t>3</a:t>
             </a:r>
             <a:endParaRPr lang="en-GB" dirty="0"/>
-          </a:p>
-        </p:txBody>
-      </p:sp>
-      <p:sp>
-        <p:nvSpPr>
-          <p:cNvPr id="3" name="Subtitle 2"/>
-          <p:cNvSpPr>
-            <a:spLocks noGrp="1"/>
-          </p:cNvSpPr>
-          <p:nvPr>
-            <p:ph type="subTitle" idx="1"/>
-          </p:nvPr>
-        </p:nvSpPr>
-        <p:spPr/>
-        <p:txBody>
-          <a:bodyPr/>
-          <a:lstStyle/>
-          <a:p>
-            <a:endParaRPr lang="en-GB"/>
           </a:p>
         </p:txBody>
       </p:sp>
     </p:spTree>
     <p:extLst>
       <p:ext uri="{BB962C8B-B14F-4D97-AF65-F5344CB8AC3E}">
-        <p14:creationId xmlns:p14="http://schemas.microsoft.com/office/powerpoint/2010/main" val="3353074603"/>
+        <p14:creationId xmlns:p14="http://schemas.microsoft.com/office/powerpoint/2010/main" val="4276374490"/>
       </p:ext>
     </p:extLst>
   </p:cSld>
@@ -3198,42 +3162,30 @@
             <p:ph type="ctrTitle"/>
           </p:nvPr>
         </p:nvSpPr>
-        <p:spPr/>
-        <p:txBody>
-          <a:bodyPr/>
-          <a:lstStyle/>
-          <a:p>
-            <a:r>
-              <a:rPr lang="it-IT" smtClean="0"/>
+        <p:spPr>
+          <a:xfrm flipH="1">
+            <a:off x="11493778" y="87117"/>
+            <a:ext cx="566633" cy="843396"/>
+          </a:xfrm>
+        </p:spPr>
+        <p:txBody>
+          <a:bodyPr>
+            <a:normAutofit fontScale="90000"/>
+          </a:bodyPr>
+          <a:lstStyle/>
+          <a:p>
+            <a:r>
+              <a:rPr lang="it-IT" dirty="0"/>
               <a:t>4</a:t>
             </a:r>
-            <a:endParaRPr lang="en-GB"/>
-          </a:p>
-        </p:txBody>
-      </p:sp>
-      <p:sp>
-        <p:nvSpPr>
-          <p:cNvPr id="3" name="Subtitle 2"/>
-          <p:cNvSpPr>
-            <a:spLocks noGrp="1"/>
-          </p:cNvSpPr>
-          <p:nvPr>
-            <p:ph type="subTitle" idx="1"/>
-          </p:nvPr>
-        </p:nvSpPr>
-        <p:spPr/>
-        <p:txBody>
-          <a:bodyPr/>
-          <a:lstStyle/>
-          <a:p>
-            <a:endParaRPr lang="en-GB"/>
+            <a:endParaRPr lang="en-GB" dirty="0"/>
           </a:p>
         </p:txBody>
       </p:sp>
     </p:spTree>
     <p:extLst>
       <p:ext uri="{BB962C8B-B14F-4D97-AF65-F5344CB8AC3E}">
-        <p14:creationId xmlns:p14="http://schemas.microsoft.com/office/powerpoint/2010/main" val="3288916378"/>
+        <p14:creationId xmlns:p14="http://schemas.microsoft.com/office/powerpoint/2010/main" val="320527220"/>
       </p:ext>
     </p:extLst>
   </p:cSld>

</xml_diff>